<commit_message>
designed roadmap for mysql
</commit_message>
<xml_diff>
--- a/SQL/Lecture01/lect01.pptx
+++ b/SQL/Lecture01/lect01.pptx
@@ -10,8 +10,6 @@
     <p:sldId id="259" r:id="rId4"/>
     <p:sldId id="261" r:id="rId5"/>
     <p:sldId id="262" r:id="rId6"/>
-    <p:sldId id="263" r:id="rId7"/>
-    <p:sldId id="264" r:id="rId8"/>
   </p:sldIdLst>
   <p:sldSz cx="12192000" cy="6858000"/>
   <p:notesSz cx="6858000" cy="9144000"/>
@@ -289,7 +287,7 @@
           <a:p>
             <a:fld id="{01073E63-E6DB-47C4-83C3-3B15F4151B12}" type="datetimeFigureOut">
               <a:rPr lang="en-US" smtClean="0"/>
-              <a:t>2/16/2024</a:t>
+              <a:t>4/27/2024</a:t>
             </a:fld>
             <a:endParaRPr lang="en-US"/>
           </a:p>
@@ -601,7 +599,7 @@
           <a:p>
             <a:fld id="{01073E63-E6DB-47C4-83C3-3B15F4151B12}" type="datetimeFigureOut">
               <a:rPr lang="en-US" smtClean="0"/>
-              <a:t>2/16/2024</a:t>
+              <a:t>4/27/2024</a:t>
             </a:fld>
             <a:endParaRPr lang="en-US"/>
           </a:p>
@@ -823,7 +821,7 @@
           <a:p>
             <a:fld id="{01073E63-E6DB-47C4-83C3-3B15F4151B12}" type="datetimeFigureOut">
               <a:rPr lang="en-US" smtClean="0"/>
-              <a:t>2/16/2024</a:t>
+              <a:t>4/27/2024</a:t>
             </a:fld>
             <a:endParaRPr lang="en-US"/>
           </a:p>
@@ -1114,7 +1112,7 @@
           <a:p>
             <a:fld id="{01073E63-E6DB-47C4-83C3-3B15F4151B12}" type="datetimeFigureOut">
               <a:rPr lang="en-US" smtClean="0"/>
-              <a:t>2/16/2024</a:t>
+              <a:t>4/27/2024</a:t>
             </a:fld>
             <a:endParaRPr lang="en-US"/>
           </a:p>
@@ -1568,7 +1566,7 @@
           <a:p>
             <a:fld id="{01073E63-E6DB-47C4-83C3-3B15F4151B12}" type="datetimeFigureOut">
               <a:rPr lang="en-US" smtClean="0"/>
-              <a:t>2/16/2024</a:t>
+              <a:t>4/27/2024</a:t>
             </a:fld>
             <a:endParaRPr lang="en-US"/>
           </a:p>
@@ -2144,7 +2142,7 @@
           <a:p>
             <a:fld id="{01073E63-E6DB-47C4-83C3-3B15F4151B12}" type="datetimeFigureOut">
               <a:rPr lang="en-US" smtClean="0"/>
-              <a:t>2/16/2024</a:t>
+              <a:t>4/27/2024</a:t>
             </a:fld>
             <a:endParaRPr lang="en-US"/>
           </a:p>
@@ -2996,7 +2994,7 @@
           <a:p>
             <a:fld id="{01073E63-E6DB-47C4-83C3-3B15F4151B12}" type="datetimeFigureOut">
               <a:rPr lang="en-US" smtClean="0"/>
-              <a:t>2/16/2024</a:t>
+              <a:t>4/27/2024</a:t>
             </a:fld>
             <a:endParaRPr lang="en-US"/>
           </a:p>
@@ -3201,7 +3199,7 @@
           <a:p>
             <a:fld id="{01073E63-E6DB-47C4-83C3-3B15F4151B12}" type="datetimeFigureOut">
               <a:rPr lang="en-US" smtClean="0"/>
-              <a:t>2/16/2024</a:t>
+              <a:t>4/27/2024</a:t>
             </a:fld>
             <a:endParaRPr lang="en-US"/>
           </a:p>
@@ -3415,7 +3413,7 @@
           <a:p>
             <a:fld id="{01073E63-E6DB-47C4-83C3-3B15F4151B12}" type="datetimeFigureOut">
               <a:rPr lang="en-US" smtClean="0"/>
-              <a:t>2/16/2024</a:t>
+              <a:t>4/27/2024</a:t>
             </a:fld>
             <a:endParaRPr lang="en-US"/>
           </a:p>
@@ -3620,7 +3618,7 @@
           <a:p>
             <a:fld id="{01073E63-E6DB-47C4-83C3-3B15F4151B12}" type="datetimeFigureOut">
               <a:rPr lang="en-US" smtClean="0"/>
-              <a:t>2/16/2024</a:t>
+              <a:t>4/27/2024</a:t>
             </a:fld>
             <a:endParaRPr lang="en-US"/>
           </a:p>
@@ -3900,7 +3898,7 @@
           <a:p>
             <a:fld id="{01073E63-E6DB-47C4-83C3-3B15F4151B12}" type="datetimeFigureOut">
               <a:rPr lang="en-US" smtClean="0"/>
-              <a:t>2/16/2024</a:t>
+              <a:t>4/27/2024</a:t>
             </a:fld>
             <a:endParaRPr lang="en-US"/>
           </a:p>
@@ -4167,7 +4165,7 @@
           <a:p>
             <a:fld id="{01073E63-E6DB-47C4-83C3-3B15F4151B12}" type="datetimeFigureOut">
               <a:rPr lang="en-US" smtClean="0"/>
-              <a:t>2/16/2024</a:t>
+              <a:t>4/27/2024</a:t>
             </a:fld>
             <a:endParaRPr lang="en-US"/>
           </a:p>
@@ -4582,7 +4580,7 @@
           <a:p>
             <a:fld id="{01073E63-E6DB-47C4-83C3-3B15F4151B12}" type="datetimeFigureOut">
               <a:rPr lang="en-US" smtClean="0"/>
-              <a:t>2/16/2024</a:t>
+              <a:t>4/27/2024</a:t>
             </a:fld>
             <a:endParaRPr lang="en-US"/>
           </a:p>
@@ -4730,7 +4728,7 @@
           <a:p>
             <a:fld id="{01073E63-E6DB-47C4-83C3-3B15F4151B12}" type="datetimeFigureOut">
               <a:rPr lang="en-US" smtClean="0"/>
-              <a:t>2/16/2024</a:t>
+              <a:t>4/27/2024</a:t>
             </a:fld>
             <a:endParaRPr lang="en-US"/>
           </a:p>
@@ -4855,7 +4853,7 @@
           <a:p>
             <a:fld id="{01073E63-E6DB-47C4-83C3-3B15F4151B12}" type="datetimeFigureOut">
               <a:rPr lang="en-US" smtClean="0"/>
-              <a:t>2/16/2024</a:t>
+              <a:t>4/27/2024</a:t>
             </a:fld>
             <a:endParaRPr lang="en-US"/>
           </a:p>
@@ -5134,7 +5132,7 @@
           <a:p>
             <a:fld id="{01073E63-E6DB-47C4-83C3-3B15F4151B12}" type="datetimeFigureOut">
               <a:rPr lang="en-US" smtClean="0"/>
-              <a:t>2/16/2024</a:t>
+              <a:t>4/27/2024</a:t>
             </a:fld>
             <a:endParaRPr lang="en-US"/>
           </a:p>
@@ -5446,7 +5444,7 @@
           <a:p>
             <a:fld id="{01073E63-E6DB-47C4-83C3-3B15F4151B12}" type="datetimeFigureOut">
               <a:rPr lang="en-US" smtClean="0"/>
-              <a:t>2/16/2024</a:t>
+              <a:t>4/27/2024</a:t>
             </a:fld>
             <a:endParaRPr lang="en-US"/>
           </a:p>
@@ -5699,7 +5697,7 @@
           <a:p>
             <a:fld id="{01073E63-E6DB-47C4-83C3-3B15F4151B12}" type="datetimeFigureOut">
               <a:rPr lang="en-US" smtClean="0"/>
-              <a:t>2/16/2024</a:t>
+              <a:t>4/27/2024</a:t>
             </a:fld>
             <a:endParaRPr lang="en-US"/>
           </a:p>
@@ -6540,19 +6538,8 @@
                 <a:latin typeface="Arial" panose="020B0604020202020204" pitchFamily="34" charset="0"/>
                 <a:cs typeface="Arial" panose="020B0604020202020204" pitchFamily="34" charset="0"/>
               </a:rPr>
-              <a:t>Non-relational databases allow more flexible data models without insisting on a fixed design</a:t>
-            </a:r>
-            <a:r>
-              <a:rPr lang="en-US" cap="none" dirty="0" smtClean="0">
-                <a:latin typeface="Arial" panose="020B0604020202020204" pitchFamily="34" charset="0"/>
-                <a:cs typeface="Arial" panose="020B0604020202020204" pitchFamily="34" charset="0"/>
-              </a:rPr>
-              <a:t>.</a:t>
-            </a:r>
-            <a:endParaRPr lang="en-US" cap="none" dirty="0" smtClean="0">
-              <a:latin typeface="Arial" panose="020B0604020202020204" pitchFamily="34" charset="0"/>
-              <a:cs typeface="Arial" panose="020B0604020202020204" pitchFamily="34" charset="0"/>
-            </a:endParaRPr>
+              <a:t>Non-relational databases allow more flexible data models without insisting on a fixed design.</a:t>
+            </a:r>
           </a:p>
           <a:p>
             <a:pPr>
@@ -9162,852 +9149,6 @@
 </p:sld>
 </file>
 
-<file path=ppt/slides/slide6.xml><?xml version="1.0" encoding="utf-8"?>
-<p:sld xmlns:a="http://schemas.openxmlformats.org/drawingml/2006/main" xmlns:r="http://schemas.openxmlformats.org/officeDocument/2006/relationships" xmlns:p="http://schemas.openxmlformats.org/presentationml/2006/main">
-  <p:cSld>
-    <p:spTree>
-      <p:nvGrpSpPr>
-        <p:cNvPr id="1" name=""/>
-        <p:cNvGrpSpPr/>
-        <p:nvPr/>
-      </p:nvGrpSpPr>
-      <p:grpSpPr>
-        <a:xfrm>
-          <a:off x="0" y="0"/>
-          <a:ext cx="0" cy="0"/>
-          <a:chOff x="0" y="0"/>
-          <a:chExt cx="0" cy="0"/>
-        </a:xfrm>
-      </p:grpSpPr>
-      <p:sp>
-        <p:nvSpPr>
-          <p:cNvPr id="20" name="Rectangle 19"/>
-          <p:cNvSpPr/>
-          <p:nvPr/>
-        </p:nvSpPr>
-        <p:spPr>
-          <a:xfrm>
-            <a:off x="820881" y="1139290"/>
-            <a:ext cx="10217728" cy="1399309"/>
-          </a:xfrm>
-          <a:prstGeom prst="rect">
-            <a:avLst/>
-          </a:prstGeom>
-          <a:solidFill>
-            <a:schemeClr val="bg1">
-              <a:lumMod val="95000"/>
-            </a:schemeClr>
-          </a:solidFill>
-          <a:ln>
-            <a:solidFill>
-              <a:schemeClr val="accent6"/>
-            </a:solidFill>
-          </a:ln>
-        </p:spPr>
-        <p:style>
-          <a:lnRef idx="2">
-            <a:schemeClr val="accent1">
-              <a:shade val="50000"/>
-            </a:schemeClr>
-          </a:lnRef>
-          <a:fillRef idx="1">
-            <a:schemeClr val="accent1"/>
-          </a:fillRef>
-          <a:effectRef idx="0">
-            <a:schemeClr val="accent1"/>
-          </a:effectRef>
-          <a:fontRef idx="minor">
-            <a:schemeClr val="lt1"/>
-          </a:fontRef>
-        </p:style>
-        <p:txBody>
-          <a:bodyPr rtlCol="0" anchor="ctr"/>
-          <a:lstStyle/>
-          <a:p>
-            <a:pPr algn="ctr"/>
-            <a:endParaRPr lang="en-US"/>
-          </a:p>
-        </p:txBody>
-      </p:sp>
-      <p:sp>
-        <p:nvSpPr>
-          <p:cNvPr id="18" name="TextBox 17"/>
-          <p:cNvSpPr txBox="1"/>
-          <p:nvPr/>
-        </p:nvSpPr>
-        <p:spPr>
-          <a:xfrm>
-            <a:off x="1052945" y="1246909"/>
-            <a:ext cx="9753600" cy="707886"/>
-          </a:xfrm>
-          <a:prstGeom prst="rect">
-            <a:avLst/>
-          </a:prstGeom>
-          <a:noFill/>
-        </p:spPr>
-        <p:txBody>
-          <a:bodyPr wrap="square" rtlCol="0">
-            <a:spAutoFit/>
-          </a:bodyPr>
-          <a:lstStyle/>
-          <a:p>
-            <a:pPr marL="342900" indent="-342900">
-              <a:buFont typeface="Wingdings" panose="05000000000000000000" pitchFamily="2" charset="2"/>
-              <a:buChar char="Ø"/>
-            </a:pPr>
-            <a:r>
-              <a:rPr lang="en-US" sz="2000" dirty="0" smtClean="0">
-                <a:latin typeface="Arial" panose="020B0604020202020204" pitchFamily="34" charset="0"/>
-                <a:cs typeface="Arial" panose="020B0604020202020204" pitchFamily="34" charset="0"/>
-              </a:rPr>
-              <a:t>Creating Database. </a:t>
-            </a:r>
-          </a:p>
-          <a:p>
-            <a:r>
-              <a:rPr lang="en-US" sz="2000" dirty="0" smtClean="0">
-                <a:latin typeface="Arial" panose="020B0604020202020204" pitchFamily="34" charset="0"/>
-                <a:cs typeface="Arial" panose="020B0604020202020204" pitchFamily="34" charset="0"/>
-              </a:rPr>
-              <a:t>In place of `</a:t>
-            </a:r>
-            <a:r>
-              <a:rPr lang="en-US" sz="2000" dirty="0" err="1" smtClean="0">
-                <a:latin typeface="Arial" panose="020B0604020202020204" pitchFamily="34" charset="0"/>
-                <a:cs typeface="Arial" panose="020B0604020202020204" pitchFamily="34" charset="0"/>
-              </a:rPr>
-              <a:t>database_name</a:t>
-            </a:r>
-            <a:r>
-              <a:rPr lang="en-US" sz="2000" dirty="0" smtClean="0">
-                <a:latin typeface="Arial" panose="020B0604020202020204" pitchFamily="34" charset="0"/>
-                <a:cs typeface="Arial" panose="020B0604020202020204" pitchFamily="34" charset="0"/>
-              </a:rPr>
-              <a:t>`, write the name of the database you want.</a:t>
-            </a:r>
-            <a:endParaRPr lang="en-US" sz="2000" dirty="0">
-              <a:latin typeface="Arial" panose="020B0604020202020204" pitchFamily="34" charset="0"/>
-              <a:cs typeface="Arial" panose="020B0604020202020204" pitchFamily="34" charset="0"/>
-            </a:endParaRPr>
-          </a:p>
-        </p:txBody>
-      </p:sp>
-      <p:sp>
-        <p:nvSpPr>
-          <p:cNvPr id="19" name="TextBox 18"/>
-          <p:cNvSpPr txBox="1"/>
-          <p:nvPr/>
-        </p:nvSpPr>
-        <p:spPr>
-          <a:xfrm>
-            <a:off x="1052945" y="1949781"/>
-            <a:ext cx="9753600" cy="400110"/>
-          </a:xfrm>
-          <a:prstGeom prst="rect">
-            <a:avLst/>
-          </a:prstGeom>
-          <a:solidFill>
-            <a:schemeClr val="accent2">
-              <a:lumMod val="60000"/>
-              <a:lumOff val="40000"/>
-            </a:schemeClr>
-          </a:solidFill>
-        </p:spPr>
-        <p:txBody>
-          <a:bodyPr wrap="square" rtlCol="0">
-            <a:spAutoFit/>
-          </a:bodyPr>
-          <a:lstStyle/>
-          <a:p>
-            <a:r>
-              <a:rPr lang="en-US" sz="2000" dirty="0" smtClean="0">
-                <a:latin typeface="Arial" panose="020B0604020202020204" pitchFamily="34" charset="0"/>
-                <a:cs typeface="Arial" panose="020B0604020202020204" pitchFamily="34" charset="0"/>
-              </a:rPr>
-              <a:t>CREATE DATABASE </a:t>
-            </a:r>
-            <a:r>
-              <a:rPr lang="en-US" sz="2000" dirty="0" err="1" smtClean="0">
-                <a:latin typeface="Arial" panose="020B0604020202020204" pitchFamily="34" charset="0"/>
-                <a:cs typeface="Arial" panose="020B0604020202020204" pitchFamily="34" charset="0"/>
-              </a:rPr>
-              <a:t>database_name</a:t>
-            </a:r>
-            <a:r>
-              <a:rPr lang="en-US" sz="2000" dirty="0" smtClean="0">
-                <a:latin typeface="Arial" panose="020B0604020202020204" pitchFamily="34" charset="0"/>
-                <a:cs typeface="Arial" panose="020B0604020202020204" pitchFamily="34" charset="0"/>
-              </a:rPr>
-              <a:t>;</a:t>
-            </a:r>
-            <a:endParaRPr lang="en-US" sz="2000" dirty="0">
-              <a:latin typeface="Arial" panose="020B0604020202020204" pitchFamily="34" charset="0"/>
-              <a:cs typeface="Arial" panose="020B0604020202020204" pitchFamily="34" charset="0"/>
-            </a:endParaRPr>
-          </a:p>
-        </p:txBody>
-      </p:sp>
-      <p:sp>
-        <p:nvSpPr>
-          <p:cNvPr id="21" name="Rectangle 20"/>
-          <p:cNvSpPr/>
-          <p:nvPr/>
-        </p:nvSpPr>
-        <p:spPr>
-          <a:xfrm>
-            <a:off x="820881" y="2940381"/>
-            <a:ext cx="10217728" cy="1399309"/>
-          </a:xfrm>
-          <a:prstGeom prst="rect">
-            <a:avLst/>
-          </a:prstGeom>
-          <a:solidFill>
-            <a:schemeClr val="bg1">
-              <a:lumMod val="95000"/>
-            </a:schemeClr>
-          </a:solidFill>
-          <a:ln>
-            <a:solidFill>
-              <a:schemeClr val="accent6"/>
-            </a:solidFill>
-          </a:ln>
-        </p:spPr>
-        <p:style>
-          <a:lnRef idx="2">
-            <a:schemeClr val="accent1">
-              <a:shade val="50000"/>
-            </a:schemeClr>
-          </a:lnRef>
-          <a:fillRef idx="1">
-            <a:schemeClr val="accent1"/>
-          </a:fillRef>
-          <a:effectRef idx="0">
-            <a:schemeClr val="accent1"/>
-          </a:effectRef>
-          <a:fontRef idx="minor">
-            <a:schemeClr val="lt1"/>
-          </a:fontRef>
-        </p:style>
-        <p:txBody>
-          <a:bodyPr rtlCol="0" anchor="ctr"/>
-          <a:lstStyle/>
-          <a:p>
-            <a:pPr algn="ctr"/>
-            <a:endParaRPr lang="en-US"/>
-          </a:p>
-        </p:txBody>
-      </p:sp>
-      <p:sp>
-        <p:nvSpPr>
-          <p:cNvPr id="22" name="TextBox 21"/>
-          <p:cNvSpPr txBox="1"/>
-          <p:nvPr/>
-        </p:nvSpPr>
-        <p:spPr>
-          <a:xfrm>
-            <a:off x="1052945" y="3752544"/>
-            <a:ext cx="9753600" cy="400110"/>
-          </a:xfrm>
-          <a:prstGeom prst="rect">
-            <a:avLst/>
-          </a:prstGeom>
-          <a:solidFill>
-            <a:schemeClr val="accent2">
-              <a:lumMod val="60000"/>
-              <a:lumOff val="40000"/>
-            </a:schemeClr>
-          </a:solidFill>
-        </p:spPr>
-        <p:txBody>
-          <a:bodyPr wrap="square" rtlCol="0">
-            <a:spAutoFit/>
-          </a:bodyPr>
-          <a:lstStyle/>
-          <a:p>
-            <a:r>
-              <a:rPr lang="en-US" sz="2000" dirty="0" smtClean="0">
-                <a:latin typeface="Arial" panose="020B0604020202020204" pitchFamily="34" charset="0"/>
-                <a:cs typeface="Arial" panose="020B0604020202020204" pitchFamily="34" charset="0"/>
-              </a:rPr>
-              <a:t>DELETE DATABASE </a:t>
-            </a:r>
-            <a:r>
-              <a:rPr lang="en-US" sz="2000" dirty="0" err="1" smtClean="0">
-                <a:latin typeface="Arial" panose="020B0604020202020204" pitchFamily="34" charset="0"/>
-                <a:cs typeface="Arial" panose="020B0604020202020204" pitchFamily="34" charset="0"/>
-              </a:rPr>
-              <a:t>database_name</a:t>
-            </a:r>
-            <a:r>
-              <a:rPr lang="en-US" sz="2000" dirty="0" smtClean="0">
-                <a:latin typeface="Arial" panose="020B0604020202020204" pitchFamily="34" charset="0"/>
-                <a:cs typeface="Arial" panose="020B0604020202020204" pitchFamily="34" charset="0"/>
-              </a:rPr>
-              <a:t>;</a:t>
-            </a:r>
-            <a:endParaRPr lang="en-US" sz="2000" dirty="0">
-              <a:latin typeface="Arial" panose="020B0604020202020204" pitchFamily="34" charset="0"/>
-              <a:cs typeface="Arial" panose="020B0604020202020204" pitchFamily="34" charset="0"/>
-            </a:endParaRPr>
-          </a:p>
-        </p:txBody>
-      </p:sp>
-      <p:sp>
-        <p:nvSpPr>
-          <p:cNvPr id="23" name="TextBox 22"/>
-          <p:cNvSpPr txBox="1"/>
-          <p:nvPr/>
-        </p:nvSpPr>
-        <p:spPr>
-          <a:xfrm>
-            <a:off x="1052945" y="3042986"/>
-            <a:ext cx="9753600" cy="707886"/>
-          </a:xfrm>
-          <a:prstGeom prst="rect">
-            <a:avLst/>
-          </a:prstGeom>
-          <a:noFill/>
-        </p:spPr>
-        <p:txBody>
-          <a:bodyPr wrap="square" rtlCol="0">
-            <a:spAutoFit/>
-          </a:bodyPr>
-          <a:lstStyle/>
-          <a:p>
-            <a:pPr marL="342900" indent="-342900">
-              <a:buFont typeface="Wingdings" panose="05000000000000000000" pitchFamily="2" charset="2"/>
-              <a:buChar char="Ø"/>
-            </a:pPr>
-            <a:r>
-              <a:rPr lang="en-US" sz="2000" dirty="0" smtClean="0">
-                <a:latin typeface="Arial" panose="020B0604020202020204" pitchFamily="34" charset="0"/>
-                <a:cs typeface="Arial" panose="020B0604020202020204" pitchFamily="34" charset="0"/>
-              </a:rPr>
-              <a:t>Deleting Database. </a:t>
-            </a:r>
-          </a:p>
-          <a:p>
-            <a:r>
-              <a:rPr lang="en-US" sz="2000" dirty="0" smtClean="0">
-                <a:latin typeface="Arial" panose="020B0604020202020204" pitchFamily="34" charset="0"/>
-                <a:cs typeface="Arial" panose="020B0604020202020204" pitchFamily="34" charset="0"/>
-              </a:rPr>
-              <a:t>In place of `</a:t>
-            </a:r>
-            <a:r>
-              <a:rPr lang="en-US" sz="2000" dirty="0" err="1" smtClean="0">
-                <a:latin typeface="Arial" panose="020B0604020202020204" pitchFamily="34" charset="0"/>
-                <a:cs typeface="Arial" panose="020B0604020202020204" pitchFamily="34" charset="0"/>
-              </a:rPr>
-              <a:t>database_name</a:t>
-            </a:r>
-            <a:r>
-              <a:rPr lang="en-US" sz="2000" dirty="0" smtClean="0">
-                <a:latin typeface="Arial" panose="020B0604020202020204" pitchFamily="34" charset="0"/>
-                <a:cs typeface="Arial" panose="020B0604020202020204" pitchFamily="34" charset="0"/>
-              </a:rPr>
-              <a:t>`, write the name of the database.</a:t>
-            </a:r>
-            <a:endParaRPr lang="en-US" sz="2000" dirty="0">
-              <a:latin typeface="Arial" panose="020B0604020202020204" pitchFamily="34" charset="0"/>
-              <a:cs typeface="Arial" panose="020B0604020202020204" pitchFamily="34" charset="0"/>
-            </a:endParaRPr>
-          </a:p>
-        </p:txBody>
-      </p:sp>
-      <p:sp>
-        <p:nvSpPr>
-          <p:cNvPr id="27" name="Rectangle 26"/>
-          <p:cNvSpPr/>
-          <p:nvPr/>
-        </p:nvSpPr>
-        <p:spPr>
-          <a:xfrm>
-            <a:off x="820881" y="4813962"/>
-            <a:ext cx="10217728" cy="1399309"/>
-          </a:xfrm>
-          <a:prstGeom prst="rect">
-            <a:avLst/>
-          </a:prstGeom>
-          <a:solidFill>
-            <a:schemeClr val="bg1">
-              <a:lumMod val="95000"/>
-            </a:schemeClr>
-          </a:solidFill>
-          <a:ln>
-            <a:solidFill>
-              <a:schemeClr val="accent6"/>
-            </a:solidFill>
-          </a:ln>
-        </p:spPr>
-        <p:style>
-          <a:lnRef idx="2">
-            <a:schemeClr val="accent1">
-              <a:shade val="50000"/>
-            </a:schemeClr>
-          </a:lnRef>
-          <a:fillRef idx="1">
-            <a:schemeClr val="accent1"/>
-          </a:fillRef>
-          <a:effectRef idx="0">
-            <a:schemeClr val="accent1"/>
-          </a:effectRef>
-          <a:fontRef idx="minor">
-            <a:schemeClr val="lt1"/>
-          </a:fontRef>
-        </p:style>
-        <p:txBody>
-          <a:bodyPr rtlCol="0" anchor="ctr"/>
-          <a:lstStyle/>
-          <a:p>
-            <a:pPr algn="ctr"/>
-            <a:endParaRPr lang="en-US"/>
-          </a:p>
-        </p:txBody>
-      </p:sp>
-      <p:sp>
-        <p:nvSpPr>
-          <p:cNvPr id="28" name="TextBox 27"/>
-          <p:cNvSpPr txBox="1"/>
-          <p:nvPr/>
-        </p:nvSpPr>
-        <p:spPr>
-          <a:xfrm>
-            <a:off x="1052945" y="5564919"/>
-            <a:ext cx="9753600" cy="400110"/>
-          </a:xfrm>
-          <a:prstGeom prst="rect">
-            <a:avLst/>
-          </a:prstGeom>
-          <a:solidFill>
-            <a:schemeClr val="accent2">
-              <a:lumMod val="60000"/>
-              <a:lumOff val="40000"/>
-            </a:schemeClr>
-          </a:solidFill>
-        </p:spPr>
-        <p:txBody>
-          <a:bodyPr wrap="square" rtlCol="0">
-            <a:spAutoFit/>
-          </a:bodyPr>
-          <a:lstStyle/>
-          <a:p>
-            <a:r>
-              <a:rPr lang="en-US" sz="2000" dirty="0" smtClean="0">
-                <a:latin typeface="Arial" panose="020B0604020202020204" pitchFamily="34" charset="0"/>
-                <a:cs typeface="Arial" panose="020B0604020202020204" pitchFamily="34" charset="0"/>
-              </a:rPr>
-              <a:t>SHOW TABLES;</a:t>
-            </a:r>
-            <a:endParaRPr lang="en-US" sz="2000" dirty="0">
-              <a:latin typeface="Arial" panose="020B0604020202020204" pitchFamily="34" charset="0"/>
-              <a:cs typeface="Arial" panose="020B0604020202020204" pitchFamily="34" charset="0"/>
-            </a:endParaRPr>
-          </a:p>
-        </p:txBody>
-      </p:sp>
-      <p:sp>
-        <p:nvSpPr>
-          <p:cNvPr id="29" name="TextBox 28"/>
-          <p:cNvSpPr txBox="1"/>
-          <p:nvPr/>
-        </p:nvSpPr>
-        <p:spPr>
-          <a:xfrm>
-            <a:off x="1052945" y="4989386"/>
-            <a:ext cx="9753600" cy="400110"/>
-          </a:xfrm>
-          <a:prstGeom prst="rect">
-            <a:avLst/>
-          </a:prstGeom>
-          <a:noFill/>
-        </p:spPr>
-        <p:txBody>
-          <a:bodyPr wrap="square" rtlCol="0">
-            <a:spAutoFit/>
-          </a:bodyPr>
-          <a:lstStyle/>
-          <a:p>
-            <a:pPr marL="342900" indent="-342900">
-              <a:buFont typeface="Wingdings" panose="05000000000000000000" pitchFamily="2" charset="2"/>
-              <a:buChar char="Ø"/>
-            </a:pPr>
-            <a:r>
-              <a:rPr lang="en-US" sz="2000" dirty="0" smtClean="0">
-                <a:latin typeface="Arial" panose="020B0604020202020204" pitchFamily="34" charset="0"/>
-                <a:cs typeface="Arial" panose="020B0604020202020204" pitchFamily="34" charset="0"/>
-              </a:rPr>
-              <a:t>To see all the tables inside your database, you can use the following command. </a:t>
-            </a:r>
-          </a:p>
-        </p:txBody>
-      </p:sp>
-    </p:spTree>
-    <p:extLst>
-      <p:ext uri="{BB962C8B-B14F-4D97-AF65-F5344CB8AC3E}">
-        <p14:creationId xmlns:p14="http://schemas.microsoft.com/office/powerpoint/2010/main" val="3455053910"/>
-      </p:ext>
-    </p:extLst>
-  </p:cSld>
-  <p:clrMapOvr>
-    <a:masterClrMapping/>
-  </p:clrMapOvr>
-  <p:timing>
-    <p:tnLst>
-      <p:par>
-        <p:cTn id="1" dur="indefinite" restart="never" nodeType="tmRoot"/>
-      </p:par>
-    </p:tnLst>
-  </p:timing>
-</p:sld>
-</file>
-
-<file path=ppt/slides/slide7.xml><?xml version="1.0" encoding="utf-8"?>
-<p:sld xmlns:a="http://schemas.openxmlformats.org/drawingml/2006/main" xmlns:r="http://schemas.openxmlformats.org/officeDocument/2006/relationships" xmlns:p="http://schemas.openxmlformats.org/presentationml/2006/main">
-  <p:cSld>
-    <p:spTree>
-      <p:nvGrpSpPr>
-        <p:cNvPr id="1" name=""/>
-        <p:cNvGrpSpPr/>
-        <p:nvPr/>
-      </p:nvGrpSpPr>
-      <p:grpSpPr>
-        <a:xfrm>
-          <a:off x="0" y="0"/>
-          <a:ext cx="0" cy="0"/>
-          <a:chOff x="0" y="0"/>
-          <a:chExt cx="0" cy="0"/>
-        </a:xfrm>
-      </p:grpSpPr>
-      <p:sp>
-        <p:nvSpPr>
-          <p:cNvPr id="20" name="Rectangle 19"/>
-          <p:cNvSpPr/>
-          <p:nvPr/>
-        </p:nvSpPr>
-        <p:spPr>
-          <a:xfrm>
-            <a:off x="820881" y="1139290"/>
-            <a:ext cx="10217728" cy="1399309"/>
-          </a:xfrm>
-          <a:prstGeom prst="rect">
-            <a:avLst/>
-          </a:prstGeom>
-          <a:solidFill>
-            <a:schemeClr val="bg1">
-              <a:lumMod val="95000"/>
-            </a:schemeClr>
-          </a:solidFill>
-          <a:ln>
-            <a:solidFill>
-              <a:schemeClr val="accent6"/>
-            </a:solidFill>
-          </a:ln>
-        </p:spPr>
-        <p:style>
-          <a:lnRef idx="2">
-            <a:schemeClr val="accent1">
-              <a:shade val="50000"/>
-            </a:schemeClr>
-          </a:lnRef>
-          <a:fillRef idx="1">
-            <a:schemeClr val="accent1"/>
-          </a:fillRef>
-          <a:effectRef idx="0">
-            <a:schemeClr val="accent1"/>
-          </a:effectRef>
-          <a:fontRef idx="minor">
-            <a:schemeClr val="lt1"/>
-          </a:fontRef>
-        </p:style>
-        <p:txBody>
-          <a:bodyPr rtlCol="0" anchor="ctr"/>
-          <a:lstStyle/>
-          <a:p>
-            <a:pPr algn="ctr"/>
-            <a:endParaRPr lang="en-US"/>
-          </a:p>
-        </p:txBody>
-      </p:sp>
-      <p:sp>
-        <p:nvSpPr>
-          <p:cNvPr id="18" name="TextBox 17"/>
-          <p:cNvSpPr txBox="1"/>
-          <p:nvPr/>
-        </p:nvSpPr>
-        <p:spPr>
-          <a:xfrm>
-            <a:off x="1052945" y="1246909"/>
-            <a:ext cx="9753600" cy="400110"/>
-          </a:xfrm>
-          <a:prstGeom prst="rect">
-            <a:avLst/>
-          </a:prstGeom>
-          <a:noFill/>
-        </p:spPr>
-        <p:txBody>
-          <a:bodyPr wrap="square" rtlCol="0">
-            <a:spAutoFit/>
-          </a:bodyPr>
-          <a:lstStyle/>
-          <a:p>
-            <a:pPr marL="342900" indent="-342900">
-              <a:buFont typeface="Wingdings" panose="05000000000000000000" pitchFamily="2" charset="2"/>
-              <a:buChar char="Ø"/>
-            </a:pPr>
-            <a:r>
-              <a:rPr lang="en-US" sz="2000" dirty="0" smtClean="0">
-                <a:latin typeface="Arial" panose="020B0604020202020204" pitchFamily="34" charset="0"/>
-                <a:cs typeface="Arial" panose="020B0604020202020204" pitchFamily="34" charset="0"/>
-              </a:rPr>
-              <a:t>Creating Table. </a:t>
-            </a:r>
-          </a:p>
-        </p:txBody>
-      </p:sp>
-      <p:sp>
-        <p:nvSpPr>
-          <p:cNvPr id="19" name="TextBox 18"/>
-          <p:cNvSpPr txBox="1"/>
-          <p:nvPr/>
-        </p:nvSpPr>
-        <p:spPr>
-          <a:xfrm>
-            <a:off x="1052945" y="1949781"/>
-            <a:ext cx="9753600" cy="400110"/>
-          </a:xfrm>
-          <a:prstGeom prst="rect">
-            <a:avLst/>
-          </a:prstGeom>
-          <a:solidFill>
-            <a:schemeClr val="accent2">
-              <a:lumMod val="60000"/>
-              <a:lumOff val="40000"/>
-            </a:schemeClr>
-          </a:solidFill>
-        </p:spPr>
-        <p:txBody>
-          <a:bodyPr wrap="square" rtlCol="0">
-            <a:spAutoFit/>
-          </a:bodyPr>
-          <a:lstStyle/>
-          <a:p>
-            <a:r>
-              <a:rPr lang="en-US" sz="2000" dirty="0" smtClean="0">
-                <a:latin typeface="Arial" panose="020B0604020202020204" pitchFamily="34" charset="0"/>
-                <a:cs typeface="Arial" panose="020B0604020202020204" pitchFamily="34" charset="0"/>
-              </a:rPr>
-              <a:t>CREATE TABLE </a:t>
-            </a:r>
-            <a:r>
-              <a:rPr lang="en-US" sz="2000" dirty="0" err="1" smtClean="0">
-                <a:latin typeface="Arial" panose="020B0604020202020204" pitchFamily="34" charset="0"/>
-                <a:cs typeface="Arial" panose="020B0604020202020204" pitchFamily="34" charset="0"/>
-              </a:rPr>
-              <a:t>table_name</a:t>
-            </a:r>
-            <a:r>
-              <a:rPr lang="en-US" sz="2000" dirty="0" smtClean="0">
-                <a:latin typeface="Arial" panose="020B0604020202020204" pitchFamily="34" charset="0"/>
-                <a:cs typeface="Arial" panose="020B0604020202020204" pitchFamily="34" charset="0"/>
-              </a:rPr>
-              <a:t>{ here will come the fields or columns of the table};</a:t>
-            </a:r>
-            <a:endParaRPr lang="en-US" sz="2000" dirty="0">
-              <a:latin typeface="Arial" panose="020B0604020202020204" pitchFamily="34" charset="0"/>
-              <a:cs typeface="Arial" panose="020B0604020202020204" pitchFamily="34" charset="0"/>
-            </a:endParaRPr>
-          </a:p>
-        </p:txBody>
-      </p:sp>
-      <p:sp>
-        <p:nvSpPr>
-          <p:cNvPr id="21" name="Rectangle 20"/>
-          <p:cNvSpPr/>
-          <p:nvPr/>
-        </p:nvSpPr>
-        <p:spPr>
-          <a:xfrm>
-            <a:off x="820881" y="2940381"/>
-            <a:ext cx="10217728" cy="1399309"/>
-          </a:xfrm>
-          <a:prstGeom prst="rect">
-            <a:avLst/>
-          </a:prstGeom>
-          <a:solidFill>
-            <a:schemeClr val="bg1">
-              <a:lumMod val="95000"/>
-            </a:schemeClr>
-          </a:solidFill>
-          <a:ln>
-            <a:solidFill>
-              <a:schemeClr val="accent6"/>
-            </a:solidFill>
-          </a:ln>
-        </p:spPr>
-        <p:style>
-          <a:lnRef idx="2">
-            <a:schemeClr val="accent1">
-              <a:shade val="50000"/>
-            </a:schemeClr>
-          </a:lnRef>
-          <a:fillRef idx="1">
-            <a:schemeClr val="accent1"/>
-          </a:fillRef>
-          <a:effectRef idx="0">
-            <a:schemeClr val="accent1"/>
-          </a:effectRef>
-          <a:fontRef idx="minor">
-            <a:schemeClr val="lt1"/>
-          </a:fontRef>
-        </p:style>
-        <p:txBody>
-          <a:bodyPr rtlCol="0" anchor="ctr"/>
-          <a:lstStyle/>
-          <a:p>
-            <a:pPr algn="ctr"/>
-            <a:endParaRPr lang="en-US"/>
-          </a:p>
-        </p:txBody>
-      </p:sp>
-      <p:sp>
-        <p:nvSpPr>
-          <p:cNvPr id="22" name="TextBox 21"/>
-          <p:cNvSpPr txBox="1"/>
-          <p:nvPr/>
-        </p:nvSpPr>
-        <p:spPr>
-          <a:xfrm>
-            <a:off x="1052945" y="3752544"/>
-            <a:ext cx="9753600" cy="1323439"/>
-          </a:xfrm>
-          <a:prstGeom prst="rect">
-            <a:avLst/>
-          </a:prstGeom>
-          <a:solidFill>
-            <a:schemeClr val="accent2">
-              <a:lumMod val="60000"/>
-              <a:lumOff val="40000"/>
-            </a:schemeClr>
-          </a:solidFill>
-        </p:spPr>
-        <p:txBody>
-          <a:bodyPr wrap="square" rtlCol="0">
-            <a:spAutoFit/>
-          </a:bodyPr>
-          <a:lstStyle/>
-          <a:p>
-            <a:r>
-              <a:rPr lang="en-US" sz="2000" dirty="0" smtClean="0">
-                <a:latin typeface="Arial" panose="020B0604020202020204" pitchFamily="34" charset="0"/>
-                <a:cs typeface="Arial" panose="020B0604020202020204" pitchFamily="34" charset="0"/>
-              </a:rPr>
-              <a:t>CREATE TABLE Product {</a:t>
-            </a:r>
-          </a:p>
-          <a:p>
-            <a:r>
-              <a:rPr lang="en-US" sz="2000" dirty="0" smtClean="0">
-                <a:latin typeface="Arial" panose="020B0604020202020204" pitchFamily="34" charset="0"/>
-                <a:cs typeface="Arial" panose="020B0604020202020204" pitchFamily="34" charset="0"/>
-              </a:rPr>
-              <a:t>	</a:t>
-            </a:r>
-            <a:r>
-              <a:rPr lang="en-US" sz="2000" dirty="0" err="1" smtClean="0">
-                <a:latin typeface="Arial" panose="020B0604020202020204" pitchFamily="34" charset="0"/>
-                <a:cs typeface="Arial" panose="020B0604020202020204" pitchFamily="34" charset="0"/>
-              </a:rPr>
-              <a:t>product_id</a:t>
-            </a:r>
-            <a:r>
-              <a:rPr lang="en-US" sz="2000" dirty="0" smtClean="0">
-                <a:latin typeface="Arial" panose="020B0604020202020204" pitchFamily="34" charset="0"/>
-                <a:cs typeface="Arial" panose="020B0604020202020204" pitchFamily="34" charset="0"/>
-              </a:rPr>
-              <a:t> INT,</a:t>
-            </a:r>
-          </a:p>
-          <a:p>
-            <a:r>
-              <a:rPr lang="en-US" sz="2000" dirty="0">
-                <a:latin typeface="Arial" panose="020B0604020202020204" pitchFamily="34" charset="0"/>
-                <a:cs typeface="Arial" panose="020B0604020202020204" pitchFamily="34" charset="0"/>
-              </a:rPr>
-              <a:t>	</a:t>
-            </a:r>
-          </a:p>
-          <a:p>
-            <a:r>
-              <a:rPr lang="en-US" sz="2000" dirty="0" smtClean="0">
-                <a:latin typeface="Arial" panose="020B0604020202020204" pitchFamily="34" charset="0"/>
-                <a:cs typeface="Arial" panose="020B0604020202020204" pitchFamily="34" charset="0"/>
-              </a:rPr>
-              <a:t>};</a:t>
-            </a:r>
-            <a:endParaRPr lang="en-US" sz="2000" dirty="0">
-              <a:latin typeface="Arial" panose="020B0604020202020204" pitchFamily="34" charset="0"/>
-              <a:cs typeface="Arial" panose="020B0604020202020204" pitchFamily="34" charset="0"/>
-            </a:endParaRPr>
-          </a:p>
-        </p:txBody>
-      </p:sp>
-      <p:sp>
-        <p:nvSpPr>
-          <p:cNvPr id="23" name="TextBox 22"/>
-          <p:cNvSpPr txBox="1"/>
-          <p:nvPr/>
-        </p:nvSpPr>
-        <p:spPr>
-          <a:xfrm>
-            <a:off x="1052945" y="3042986"/>
-            <a:ext cx="9753600" cy="400110"/>
-          </a:xfrm>
-          <a:prstGeom prst="rect">
-            <a:avLst/>
-          </a:prstGeom>
-          <a:noFill/>
-        </p:spPr>
-        <p:txBody>
-          <a:bodyPr wrap="square" rtlCol="0">
-            <a:spAutoFit/>
-          </a:bodyPr>
-          <a:lstStyle/>
-          <a:p>
-            <a:pPr marL="342900" indent="-342900">
-              <a:buFont typeface="Wingdings" panose="05000000000000000000" pitchFamily="2" charset="2"/>
-              <a:buChar char="Ø"/>
-            </a:pPr>
-            <a:r>
-              <a:rPr lang="en-US" sz="2000" dirty="0" smtClean="0">
-                <a:latin typeface="Arial" panose="020B0604020202020204" pitchFamily="34" charset="0"/>
-                <a:cs typeface="Arial" panose="020B0604020202020204" pitchFamily="34" charset="0"/>
-              </a:rPr>
-              <a:t>Example </a:t>
-            </a:r>
-          </a:p>
-        </p:txBody>
-      </p:sp>
-    </p:spTree>
-    <p:extLst>
-      <p:ext uri="{BB962C8B-B14F-4D97-AF65-F5344CB8AC3E}">
-        <p14:creationId xmlns:p14="http://schemas.microsoft.com/office/powerpoint/2010/main" val="2607700167"/>
-      </p:ext>
-    </p:extLst>
-  </p:cSld>
-  <p:clrMapOvr>
-    <a:masterClrMapping/>
-  </p:clrMapOvr>
-  <p:timing>
-    <p:tnLst>
-      <p:par>
-        <p:cTn id="1" dur="indefinite" restart="never" nodeType="tmRoot"/>
-      </p:par>
-    </p:tnLst>
-  </p:timing>
-</p:sld>
-</file>
-
 <file path=ppt/theme/theme1.xml><?xml version="1.0" encoding="utf-8"?>
 <a:theme xmlns:a="http://schemas.openxmlformats.org/drawingml/2006/main" name="Droplet">
   <a:themeElements>

</xml_diff>